<commit_message>
Update Basic Bootstrap presentation
</commit_message>
<xml_diff>
--- a/Basic Bootstrap.pptx
+++ b/Basic Bootstrap.pptx
@@ -10,7 +10,9 @@
     <p:sldId id="259" r:id="rId4"/>
     <p:sldId id="261" r:id="rId5"/>
     <p:sldId id="262" r:id="rId6"/>
-    <p:sldId id="258" r:id="rId7"/>
+    <p:sldId id="263" r:id="rId7"/>
+    <p:sldId id="258" r:id="rId8"/>
+    <p:sldId id="264" r:id="rId9"/>
   </p:sldIdLst>
   <p:sldSz cx="12192000" cy="6858000"/>
   <p:notesSz cx="6858000" cy="9144000"/>
@@ -109,6 +111,11 @@
       </a:defRPr>
     </a:lvl9pPr>
   </p:defaultTextStyle>
+  <p:extLst>
+    <p:ext uri="{EFAFB233-063F-42B5-8137-9DF3F51BA10A}">
+      <p15:sldGuideLst xmlns:p15="http://schemas.microsoft.com/office/powerpoint/2012/main"/>
+    </p:ext>
+  </p:extLst>
 </p:presentation>
 </file>
 
@@ -6149,7 +6156,7 @@
           <a:p>
             <a:fld id="{E6171E64-FE02-4DE5-B72F-53C3706641C3}" type="datetimeFigureOut">
               <a:rPr lang="en-US" smtClean="0"/>
-              <a:t>3/24/2025</a:t>
+              <a:t>3/27/2025</a:t>
             </a:fld>
             <a:endParaRPr lang="en-US"/>
           </a:p>
@@ -6536,7 +6543,7 @@
           <a:p>
             <a:fld id="{E6171E64-FE02-4DE5-B72F-53C3706641C3}" type="datetimeFigureOut">
               <a:rPr lang="en-US" smtClean="0"/>
-              <a:t>3/24/2025</a:t>
+              <a:t>3/27/2025</a:t>
             </a:fld>
             <a:endParaRPr lang="en-US"/>
           </a:p>
@@ -6929,7 +6936,7 @@
           <a:p>
             <a:fld id="{E6171E64-FE02-4DE5-B72F-53C3706641C3}" type="datetimeFigureOut">
               <a:rPr lang="en-US" smtClean="0"/>
-              <a:t>3/24/2025</a:t>
+              <a:t>3/27/2025</a:t>
             </a:fld>
             <a:endParaRPr lang="en-US"/>
           </a:p>
@@ -7344,7 +7351,7 @@
           <a:p>
             <a:fld id="{E6171E64-FE02-4DE5-B72F-53C3706641C3}" type="datetimeFigureOut">
               <a:rPr lang="en-US" smtClean="0"/>
-              <a:t>3/24/2025</a:t>
+              <a:t>3/27/2025</a:t>
             </a:fld>
             <a:endParaRPr lang="en-US"/>
           </a:p>
@@ -7686,7 +7693,7 @@
           <a:p>
             <a:fld id="{E6171E64-FE02-4DE5-B72F-53C3706641C3}" type="datetimeFigureOut">
               <a:rPr lang="en-US" smtClean="0"/>
-              <a:t>3/24/2025</a:t>
+              <a:t>3/27/2025</a:t>
             </a:fld>
             <a:endParaRPr lang="en-US"/>
           </a:p>
@@ -8010,7 +8017,7 @@
           <a:p>
             <a:fld id="{E6171E64-FE02-4DE5-B72F-53C3706641C3}" type="datetimeFigureOut">
               <a:rPr lang="en-US" smtClean="0"/>
-              <a:t>3/24/2025</a:t>
+              <a:t>3/27/2025</a:t>
             </a:fld>
             <a:endParaRPr lang="en-US"/>
           </a:p>
@@ -8491,7 +8498,7 @@
           <a:p>
             <a:fld id="{E6171E64-FE02-4DE5-B72F-53C3706641C3}" type="datetimeFigureOut">
               <a:rPr lang="en-US" smtClean="0"/>
-              <a:t>3/24/2025</a:t>
+              <a:t>3/27/2025</a:t>
             </a:fld>
             <a:endParaRPr lang="en-US"/>
           </a:p>
@@ -8653,7 +8660,7 @@
           <a:p>
             <a:fld id="{E6171E64-FE02-4DE5-B72F-53C3706641C3}" type="datetimeFigureOut">
               <a:rPr lang="en-US" smtClean="0"/>
-              <a:t>3/24/2025</a:t>
+              <a:t>3/27/2025</a:t>
             </a:fld>
             <a:endParaRPr lang="en-US"/>
           </a:p>
@@ -8766,7 +8773,7 @@
           <a:p>
             <a:fld id="{E6171E64-FE02-4DE5-B72F-53C3706641C3}" type="datetimeFigureOut">
               <a:rPr lang="en-US" smtClean="0"/>
-              <a:t>3/24/2025</a:t>
+              <a:t>3/27/2025</a:t>
             </a:fld>
             <a:endParaRPr lang="en-US"/>
           </a:p>
@@ -9088,7 +9095,7 @@
           <a:p>
             <a:fld id="{E6171E64-FE02-4DE5-B72F-53C3706641C3}" type="datetimeFigureOut">
               <a:rPr lang="en-US" smtClean="0"/>
-              <a:t>3/24/2025</a:t>
+              <a:t>3/27/2025</a:t>
             </a:fld>
             <a:endParaRPr lang="en-US"/>
           </a:p>
@@ -9390,7 +9397,7 @@
           <a:p>
             <a:fld id="{E6171E64-FE02-4DE5-B72F-53C3706641C3}" type="datetimeFigureOut">
               <a:rPr lang="en-US" smtClean="0"/>
-              <a:t>3/24/2025</a:t>
+              <a:t>3/27/2025</a:t>
             </a:fld>
             <a:endParaRPr lang="en-US"/>
           </a:p>
@@ -9631,7 +9638,7 @@
           <a:p>
             <a:fld id="{E6171E64-FE02-4DE5-B72F-53C3706641C3}" type="datetimeFigureOut">
               <a:rPr lang="en-US" smtClean="0"/>
-              <a:t>3/24/2025</a:t>
+              <a:t>3/27/2025</a:t>
             </a:fld>
             <a:endParaRPr lang="en-US"/>
           </a:p>
@@ -12194,7 +12201,7 @@
           <a:lstStyle/>
           <a:p>
             <a:r>
-              <a:rPr lang="en-US">
+              <a:rPr lang="en-US" dirty="0">
                 <a:solidFill>
                   <a:srgbClr val="000000"/>
                 </a:solidFill>
@@ -12249,6 +12256,564 @@
 </file>
 
 <file path=ppt/slides/slide6.xml><?xml version="1.0" encoding="utf-8"?>
+<p:sld xmlns:a="http://schemas.openxmlformats.org/drawingml/2006/main" xmlns:r="http://schemas.openxmlformats.org/officeDocument/2006/relationships" xmlns:p="http://schemas.openxmlformats.org/presentationml/2006/main">
+  <p:cSld>
+    <p:bg>
+      <p:bgPr>
+        <a:solidFill>
+          <a:schemeClr val="bg1"/>
+        </a:solidFill>
+        <a:effectLst/>
+      </p:bgPr>
+    </p:bg>
+    <p:spTree>
+      <p:nvGrpSpPr>
+        <p:cNvPr id="1" name=""/>
+        <p:cNvGrpSpPr/>
+        <p:nvPr/>
+      </p:nvGrpSpPr>
+      <p:grpSpPr>
+        <a:xfrm>
+          <a:off x="0" y="0"/>
+          <a:ext cx="0" cy="0"/>
+          <a:chOff x="0" y="0"/>
+          <a:chExt cx="0" cy="0"/>
+        </a:xfrm>
+      </p:grpSpPr>
+      <p:sp useBgFill="1">
+        <p:nvSpPr>
+          <p:cNvPr id="10" name="Rectangle 9">
+            <a:extLst>
+              <a:ext uri="{FF2B5EF4-FFF2-40B4-BE49-F238E27FC236}">
+                <a16:creationId xmlns:a16="http://schemas.microsoft.com/office/drawing/2014/main" id="{DC024122-C80E-4076-B618-426FF2225C4C}"/>
+              </a:ext>
+              <a:ext uri="{C183D7F6-B498-43B3-948B-1728B52AA6E4}">
+                <adec:decorative xmlns:adec="http://schemas.microsoft.com/office/drawing/2017/decorative" val="1"/>
+              </a:ext>
+            </a:extLst>
+          </p:cNvPr>
+          <p:cNvSpPr>
+            <a:spLocks noGrp="1" noRot="1" noChangeAspect="1" noMove="1" noResize="1" noEditPoints="1" noAdjustHandles="1" noChangeArrowheads="1" noChangeShapeType="1" noTextEdit="1"/>
+          </p:cNvSpPr>
+          <p:nvPr>
+            <p:extLst>
+              <p:ext uri="{386F3935-93C4-4BCD-93E2-E3B085C9AB24}">
+                <p16:designElem xmlns:p16="http://schemas.microsoft.com/office/powerpoint/2015/main" val="1"/>
+              </p:ext>
+            </p:extLst>
+          </p:nvPr>
+        </p:nvSpPr>
+        <p:spPr>
+          <a:xfrm>
+            <a:off x="0" y="0"/>
+            <a:ext cx="12192000" cy="6858000"/>
+          </a:xfrm>
+          <a:prstGeom prst="rect">
+            <a:avLst/>
+          </a:prstGeom>
+          <a:ln w="12700" cap="flat" cmpd="sng" algn="ctr">
+            <a:noFill/>
+            <a:prstDash val="solid"/>
+            <a:miter lim="800000"/>
+          </a:ln>
+          <a:effectLst/>
+          <a:extLst>
+            <a:ext uri="{91240B29-F687-4F45-9708-019B960494DF}">
+              <a14:hiddenLine xmlns:a14="http://schemas.microsoft.com/office/drawing/2010/main" w="12700" cap="flat" cmpd="sng" algn="ctr">
+                <a:solidFill>
+                  <a:schemeClr val="accent1">
+                    <a:shade val="50000"/>
+                  </a:schemeClr>
+                </a:solidFill>
+                <a:prstDash val="solid"/>
+                <a:miter lim="800000"/>
+              </a14:hiddenLine>
+            </a:ext>
+          </a:extLst>
+        </p:spPr>
+        <p:style>
+          <a:lnRef idx="2">
+            <a:schemeClr val="accent1">
+              <a:shade val="50000"/>
+            </a:schemeClr>
+          </a:lnRef>
+          <a:fillRef idx="1">
+            <a:schemeClr val="accent1"/>
+          </a:fillRef>
+          <a:effectRef idx="0">
+            <a:schemeClr val="accent1"/>
+          </a:effectRef>
+          <a:fontRef idx="minor">
+            <a:schemeClr val="lt1"/>
+          </a:fontRef>
+        </p:style>
+        <p:txBody>
+          <a:bodyPr rtlCol="0" anchor="ctr"/>
+          <a:lstStyle/>
+          <a:p>
+            <a:pPr algn="ctr"/>
+            <a:endParaRPr lang="en-US"/>
+          </a:p>
+        </p:txBody>
+      </p:sp>
+      <p:sp>
+        <p:nvSpPr>
+          <p:cNvPr id="2" name="Title 1">
+            <a:extLst>
+              <a:ext uri="{FF2B5EF4-FFF2-40B4-BE49-F238E27FC236}">
+                <a16:creationId xmlns:a16="http://schemas.microsoft.com/office/drawing/2014/main" id="{2860BB5E-BC02-DACD-ACD3-DBB98B67A647}"/>
+              </a:ext>
+            </a:extLst>
+          </p:cNvPr>
+          <p:cNvSpPr>
+            <a:spLocks noGrp="1"/>
+          </p:cNvSpPr>
+          <p:nvPr>
+            <p:ph type="title"/>
+          </p:nvPr>
+        </p:nvSpPr>
+        <p:spPr>
+          <a:xfrm>
+            <a:off x="5211516" y="264548"/>
+            <a:ext cx="5874874" cy="1397004"/>
+          </a:xfrm>
+        </p:spPr>
+        <p:txBody>
+          <a:bodyPr anchor="b">
+            <a:normAutofit/>
+          </a:bodyPr>
+          <a:lstStyle/>
+          <a:p>
+            <a:r>
+              <a:rPr lang="en-US" dirty="0"/>
+              <a:t>Visual Presentation</a:t>
+            </a:r>
+          </a:p>
+        </p:txBody>
+      </p:sp>
+      <p:pic>
+        <p:nvPicPr>
+          <p:cNvPr id="7" name="Graphic 6" descr="Footer">
+            <a:extLst>
+              <a:ext uri="{FF2B5EF4-FFF2-40B4-BE49-F238E27FC236}">
+                <a16:creationId xmlns:a16="http://schemas.microsoft.com/office/drawing/2014/main" id="{2702FE75-D2D6-8283-B4A0-FA126CD855D7}"/>
+              </a:ext>
+            </a:extLst>
+          </p:cNvPr>
+          <p:cNvPicPr>
+            <a:picLocks noChangeAspect="1"/>
+          </p:cNvPicPr>
+          <p:nvPr/>
+        </p:nvPicPr>
+        <p:blipFill>
+          <a:blip r:embed="rId2">
+            <a:extLst>
+              <a:ext uri="{28A0092B-C50C-407E-A947-70E740481C1C}">
+                <a14:useLocalDpi xmlns:a14="http://schemas.microsoft.com/office/drawing/2010/main" val="0"/>
+              </a:ext>
+              <a:ext uri="{96DAC541-7B7A-43D3-8B79-37D633B846F1}">
+                <asvg:svgBlip xmlns:asvg="http://schemas.microsoft.com/office/drawing/2016/SVG/main" r:embed="rId3"/>
+              </a:ext>
+            </a:extLst>
+          </a:blip>
+          <a:stretch>
+            <a:fillRect/>
+          </a:stretch>
+        </p:blipFill>
+        <p:spPr>
+          <a:xfrm>
+            <a:off x="734515" y="2307082"/>
+            <a:ext cx="3777195" cy="3777195"/>
+          </a:xfrm>
+          <a:prstGeom prst="rect">
+            <a:avLst/>
+          </a:prstGeom>
+        </p:spPr>
+      </p:pic>
+      <p:sp>
+        <p:nvSpPr>
+          <p:cNvPr id="3" name="Content Placeholder 2">
+            <a:extLst>
+              <a:ext uri="{FF2B5EF4-FFF2-40B4-BE49-F238E27FC236}">
+                <a16:creationId xmlns:a16="http://schemas.microsoft.com/office/drawing/2014/main" id="{43C867ED-3EC6-4FB9-D786-59EAF679572F}"/>
+              </a:ext>
+            </a:extLst>
+          </p:cNvPr>
+          <p:cNvSpPr>
+            <a:spLocks noGrp="1"/>
+          </p:cNvSpPr>
+          <p:nvPr>
+            <p:ph idx="1"/>
+          </p:nvPr>
+        </p:nvSpPr>
+        <p:spPr>
+          <a:xfrm>
+            <a:off x="4706911" y="1661552"/>
+            <a:ext cx="6379479" cy="4931900"/>
+          </a:xfrm>
+        </p:spPr>
+        <p:txBody>
+          <a:bodyPr>
+            <a:normAutofit lnSpcReduction="10000"/>
+          </a:bodyPr>
+          <a:lstStyle/>
+          <a:p>
+            <a:pPr>
+              <a:lnSpc>
+                <a:spcPct val="120000"/>
+              </a:lnSpc>
+              <a:buNone/>
+            </a:pPr>
+            <a:r>
+              <a:rPr lang="en-US" sz="1400" b="0" dirty="0">
+                <a:effectLst/>
+                <a:latin typeface="Consolas" panose="020B0609020204030204" pitchFamily="49" charset="0"/>
+              </a:rPr>
+              <a:t>- p-0 to p-5</a:t>
+            </a:r>
+          </a:p>
+          <a:p>
+            <a:pPr>
+              <a:lnSpc>
+                <a:spcPct val="120000"/>
+              </a:lnSpc>
+            </a:pPr>
+            <a:r>
+              <a:rPr lang="en-US" sz="1400" b="0" dirty="0">
+                <a:effectLst/>
+                <a:latin typeface="Consolas" panose="020B0609020204030204" pitchFamily="49" charset="0"/>
+              </a:rPr>
+              <a:t>Format: p-{size} (padding)</a:t>
+            </a:r>
+          </a:p>
+          <a:p>
+            <a:pPr>
+              <a:lnSpc>
+                <a:spcPct val="120000"/>
+              </a:lnSpc>
+            </a:pPr>
+            <a:r>
+              <a:rPr lang="en-US" sz="1400" b="0" dirty="0">
+                <a:effectLst/>
+                <a:latin typeface="Consolas" panose="020B0609020204030204" pitchFamily="49" charset="0"/>
+              </a:rPr>
+              <a:t>What it does: Adds padding on ALL sides (top, right, bottom, left).</a:t>
+            </a:r>
+          </a:p>
+          <a:p>
+            <a:pPr>
+              <a:lnSpc>
+                <a:spcPct val="120000"/>
+              </a:lnSpc>
+            </a:pPr>
+            <a:r>
+              <a:rPr lang="en-US" sz="1400" b="0" dirty="0">
+                <a:effectLst/>
+                <a:latin typeface="Consolas" panose="020B0609020204030204" pitchFamily="49" charset="0"/>
+              </a:rPr>
+              <a:t>Size: 0 - 5 = 3rem (48px) of padding (Bootstrap's largest preset spacing).</a:t>
+            </a:r>
+          </a:p>
+          <a:p>
+            <a:pPr>
+              <a:lnSpc>
+                <a:spcPct val="120000"/>
+              </a:lnSpc>
+              <a:buNone/>
+            </a:pPr>
+            <a:r>
+              <a:rPr lang="en-US" sz="1400" b="0" dirty="0">
+                <a:effectLst/>
+                <a:latin typeface="Consolas" panose="020B0609020204030204" pitchFamily="49" charset="0"/>
+              </a:rPr>
+              <a:t>- mb: 0 – 5:</a:t>
+            </a:r>
+          </a:p>
+          <a:p>
+            <a:pPr>
+              <a:lnSpc>
+                <a:spcPct val="120000"/>
+              </a:lnSpc>
+            </a:pPr>
+            <a:r>
+              <a:rPr lang="en-US" sz="1400" b="0" dirty="0">
+                <a:effectLst/>
+                <a:latin typeface="Consolas" panose="020B0609020204030204" pitchFamily="49" charset="0"/>
+              </a:rPr>
+              <a:t>Format: m{b}-{size} (margin-bottom)</a:t>
+            </a:r>
+          </a:p>
+          <a:p>
+            <a:pPr>
+              <a:lnSpc>
+                <a:spcPct val="120000"/>
+              </a:lnSpc>
+            </a:pPr>
+            <a:r>
+              <a:rPr lang="en-US" sz="1400" b="0" dirty="0">
+                <a:effectLst/>
+                <a:latin typeface="Consolas" panose="020B0609020204030204" pitchFamily="49" charset="0"/>
+              </a:rPr>
+              <a:t>What it does: Adds margin ONLY to the bottom.</a:t>
+            </a:r>
+          </a:p>
+          <a:p>
+            <a:pPr>
+              <a:lnSpc>
+                <a:spcPct val="120000"/>
+              </a:lnSpc>
+            </a:pPr>
+            <a:r>
+              <a:rPr lang="en-US" sz="1400" b="0" dirty="0">
+                <a:effectLst/>
+                <a:latin typeface="Consolas" panose="020B0609020204030204" pitchFamily="49" charset="0"/>
+              </a:rPr>
+              <a:t>Size: 5 = 3rem (48px) of margin.</a:t>
+            </a:r>
+          </a:p>
+          <a:p>
+            <a:pPr>
+              <a:lnSpc>
+                <a:spcPct val="120000"/>
+              </a:lnSpc>
+              <a:buNone/>
+            </a:pPr>
+            <a:r>
+              <a:rPr lang="en-US" sz="1400" b="0" dirty="0">
+                <a:effectLst/>
+                <a:latin typeface="Consolas" panose="020B0609020204030204" pitchFamily="49" charset="0"/>
+              </a:rPr>
+              <a:t>- mt: 0 - 5</a:t>
+            </a:r>
+          </a:p>
+          <a:p>
+            <a:pPr>
+              <a:lnSpc>
+                <a:spcPct val="120000"/>
+              </a:lnSpc>
+            </a:pPr>
+            <a:r>
+              <a:rPr lang="en-US" sz="1400" b="0" dirty="0">
+                <a:effectLst/>
+                <a:latin typeface="Consolas" panose="020B0609020204030204" pitchFamily="49" charset="0"/>
+              </a:rPr>
+              <a:t>Format: m{t}-{size} (margin-top)</a:t>
+            </a:r>
+          </a:p>
+          <a:p>
+            <a:pPr>
+              <a:lnSpc>
+                <a:spcPct val="120000"/>
+              </a:lnSpc>
+            </a:pPr>
+            <a:r>
+              <a:rPr lang="en-US" sz="1400" b="0" dirty="0">
+                <a:effectLst/>
+                <a:latin typeface="Consolas" panose="020B0609020204030204" pitchFamily="49" charset="0"/>
+              </a:rPr>
+              <a:t>What it does: Adds margin ONLY to the top.</a:t>
+            </a:r>
+          </a:p>
+          <a:p>
+            <a:pPr>
+              <a:lnSpc>
+                <a:spcPct val="120000"/>
+              </a:lnSpc>
+            </a:pPr>
+            <a:r>
+              <a:rPr lang="en-US" sz="1400" b="0" dirty="0">
+                <a:effectLst/>
+                <a:latin typeface="Consolas" panose="020B0609020204030204" pitchFamily="49" charset="0"/>
+              </a:rPr>
+              <a:t>Size: 5 = 3rem (48px) of margin.</a:t>
+            </a:r>
+          </a:p>
+          <a:p>
+            <a:pPr>
+              <a:lnSpc>
+                <a:spcPct val="120000"/>
+              </a:lnSpc>
+            </a:pPr>
+            <a:endParaRPr lang="en-US" sz="1000" dirty="0"/>
+          </a:p>
+        </p:txBody>
+      </p:sp>
+      <p:grpSp>
+        <p:nvGrpSpPr>
+          <p:cNvPr id="12" name="Group 11">
+            <a:extLst>
+              <a:ext uri="{FF2B5EF4-FFF2-40B4-BE49-F238E27FC236}">
+                <a16:creationId xmlns:a16="http://schemas.microsoft.com/office/drawing/2014/main" id="{829DAB2C-3574-4B22-939F-BB6C5D2637BD}"/>
+              </a:ext>
+              <a:ext uri="{C183D7F6-B498-43B3-948B-1728B52AA6E4}">
+                <adec:decorative xmlns:adec="http://schemas.microsoft.com/office/drawing/2017/decorative" val="1"/>
+              </a:ext>
+            </a:extLst>
+          </p:cNvPr>
+          <p:cNvGrpSpPr>
+            <a:grpSpLocks noGrp="1" noUngrp="1" noRot="1" noChangeAspect="1" noMove="1" noResize="1"/>
+          </p:cNvGrpSpPr>
+          <p:nvPr>
+            <p:extLst>
+              <p:ext uri="{386F3935-93C4-4BCD-93E2-E3B085C9AB24}">
+                <p16:designElem xmlns:p16="http://schemas.microsoft.com/office/powerpoint/2015/main" val="1"/>
+              </p:ext>
+            </p:extLst>
+          </p:nvPr>
+        </p:nvGrpSpPr>
+        <p:grpSpPr>
+          <a:xfrm flipH="1" flipV="1">
+            <a:off x="11624062" y="3193365"/>
+            <a:ext cx="581000" cy="3664635"/>
+            <a:chOff x="5006254" y="-1431285"/>
+            <a:chExt cx="581000" cy="3664635"/>
+          </a:xfrm>
+        </p:grpSpPr>
+        <p:sp>
+          <p:nvSpPr>
+            <p:cNvPr id="13" name="Rectangle 12">
+              <a:extLst>
+                <a:ext uri="{FF2B5EF4-FFF2-40B4-BE49-F238E27FC236}">
+                  <a16:creationId xmlns:a16="http://schemas.microsoft.com/office/drawing/2014/main" id="{96BD37F6-BAB4-4BBF-B3E2-4395EAB835F8}"/>
+                </a:ext>
+                <a:ext uri="{C183D7F6-B498-43B3-948B-1728B52AA6E4}">
+                  <adec:decorative xmlns:adec="http://schemas.microsoft.com/office/drawing/2017/decorative" val="1"/>
+                </a:ext>
+              </a:extLst>
+            </p:cNvPr>
+            <p:cNvSpPr/>
+            <p:nvPr>
+              <p:extLst>
+                <p:ext uri="{386F3935-93C4-4BCD-93E2-E3B085C9AB24}">
+                  <p16:designElem xmlns:p16="http://schemas.microsoft.com/office/powerpoint/2015/main" val="1"/>
+                </p:ext>
+              </p:extLst>
+            </p:nvPr>
+          </p:nvSpPr>
+          <p:spPr>
+            <a:xfrm rot="10800000" flipV="1">
+              <a:off x="5061025" y="-788944"/>
+              <a:ext cx="526229" cy="3022294"/>
+            </a:xfrm>
+            <a:prstGeom prst="rect">
+              <a:avLst/>
+            </a:prstGeom>
+            <a:blipFill dpi="0" rotWithShape="1">
+              <a:blip r:embed="rId4">
+                <a:extLst>
+                  <a:ext uri="{96DAC541-7B7A-43D3-8B79-37D633B846F1}">
+                    <asvg:svgBlip xmlns:asvg="http://schemas.microsoft.com/office/drawing/2016/SVG/main" r:embed="rId5"/>
+                  </a:ext>
+                </a:extLst>
+              </a:blip>
+              <a:srcRect/>
+              <a:tile tx="0" ty="0" sx="6000" sy="6000" flip="none" algn="tl"/>
+            </a:blipFill>
+            <a:ln>
+              <a:noFill/>
+            </a:ln>
+          </p:spPr>
+          <p:style>
+            <a:lnRef idx="2">
+              <a:schemeClr val="accent1">
+                <a:shade val="50000"/>
+              </a:schemeClr>
+            </a:lnRef>
+            <a:fillRef idx="1">
+              <a:schemeClr val="accent1"/>
+            </a:fillRef>
+            <a:effectRef idx="0">
+              <a:schemeClr val="accent1"/>
+            </a:effectRef>
+            <a:fontRef idx="minor">
+              <a:schemeClr val="lt1"/>
+            </a:fontRef>
+          </p:style>
+          <p:txBody>
+            <a:bodyPr rtlCol="0" anchor="ctr"/>
+            <a:lstStyle/>
+            <a:p>
+              <a:pPr algn="ctr"/>
+              <a:endParaRPr lang="en-US"/>
+            </a:p>
+          </p:txBody>
+        </p:sp>
+        <p:sp>
+          <p:nvSpPr>
+            <p:cNvPr id="14" name="Rectangle 13">
+              <a:extLst>
+                <a:ext uri="{FF2B5EF4-FFF2-40B4-BE49-F238E27FC236}">
+                  <a16:creationId xmlns:a16="http://schemas.microsoft.com/office/drawing/2014/main" id="{B9809A8D-5A7C-4A05-9F64-844C66FABC6B}"/>
+                </a:ext>
+                <a:ext uri="{C183D7F6-B498-43B3-948B-1728B52AA6E4}">
+                  <adec:decorative xmlns:adec="http://schemas.microsoft.com/office/drawing/2017/decorative" val="1"/>
+                </a:ext>
+              </a:extLst>
+            </p:cNvPr>
+            <p:cNvSpPr/>
+            <p:nvPr>
+              <p:extLst>
+                <p:ext uri="{386F3935-93C4-4BCD-93E2-E3B085C9AB24}">
+                  <p16:designElem xmlns:p16="http://schemas.microsoft.com/office/powerpoint/2015/main" val="1"/>
+                </p:ext>
+              </p:extLst>
+            </p:nvPr>
+          </p:nvSpPr>
+          <p:spPr>
+            <a:xfrm rot="10800000" flipV="1">
+              <a:off x="5006254" y="-1431285"/>
+              <a:ext cx="206609" cy="2021305"/>
+            </a:xfrm>
+            <a:prstGeom prst="rect">
+              <a:avLst/>
+            </a:prstGeom>
+            <a:solidFill>
+              <a:schemeClr val="accent2"/>
+            </a:solidFill>
+            <a:ln>
+              <a:noFill/>
+            </a:ln>
+          </p:spPr>
+          <p:style>
+            <a:lnRef idx="2">
+              <a:schemeClr val="accent1">
+                <a:shade val="50000"/>
+              </a:schemeClr>
+            </a:lnRef>
+            <a:fillRef idx="1">
+              <a:schemeClr val="accent1"/>
+            </a:fillRef>
+            <a:effectRef idx="0">
+              <a:schemeClr val="accent1"/>
+            </a:effectRef>
+            <a:fontRef idx="minor">
+              <a:schemeClr val="lt1"/>
+            </a:fontRef>
+          </p:style>
+          <p:txBody>
+            <a:bodyPr rtlCol="0" anchor="ctr"/>
+            <a:lstStyle/>
+            <a:p>
+              <a:pPr algn="ctr"/>
+              <a:endParaRPr lang="en-US"/>
+            </a:p>
+          </p:txBody>
+        </p:sp>
+      </p:grpSp>
+    </p:spTree>
+    <p:extLst>
+      <p:ext uri="{BB962C8B-B14F-4D97-AF65-F5344CB8AC3E}">
+        <p14:creationId xmlns:p14="http://schemas.microsoft.com/office/powerpoint/2010/main" val="239567288"/>
+      </p:ext>
+    </p:extLst>
+  </p:cSld>
+  <p:clrMapOvr>
+    <a:masterClrMapping/>
+  </p:clrMapOvr>
+</p:sld>
+</file>
+
+<file path=ppt/slides/slide7.xml><?xml version="1.0" encoding="utf-8"?>
 <p:sld xmlns:a="http://schemas.openxmlformats.org/drawingml/2006/main" xmlns:r="http://schemas.openxmlformats.org/officeDocument/2006/relationships" xmlns:p="http://schemas.openxmlformats.org/presentationml/2006/main">
   <p:cSld>
     <p:bg>
@@ -12897,6 +13462,950 @@
     <p:extLst>
       <p:ext uri="{BB962C8B-B14F-4D97-AF65-F5344CB8AC3E}">
         <p14:creationId xmlns:p14="http://schemas.microsoft.com/office/powerpoint/2010/main" val="480700102"/>
+      </p:ext>
+    </p:extLst>
+  </p:cSld>
+  <p:clrMapOvr>
+    <a:masterClrMapping/>
+  </p:clrMapOvr>
+</p:sld>
+</file>
+
+<file path=ppt/slides/slide8.xml><?xml version="1.0" encoding="utf-8"?>
+<p:sld xmlns:a="http://schemas.openxmlformats.org/drawingml/2006/main" xmlns:r="http://schemas.openxmlformats.org/officeDocument/2006/relationships" xmlns:p="http://schemas.openxmlformats.org/presentationml/2006/main">
+  <p:cSld>
+    <p:bg>
+      <p:bgPr>
+        <a:solidFill>
+          <a:schemeClr val="bg1"/>
+        </a:solidFill>
+        <a:effectLst/>
+      </p:bgPr>
+    </p:bg>
+    <p:spTree>
+      <p:nvGrpSpPr>
+        <p:cNvPr id="1" name=""/>
+        <p:cNvGrpSpPr/>
+        <p:nvPr/>
+      </p:nvGrpSpPr>
+      <p:grpSpPr>
+        <a:xfrm>
+          <a:off x="0" y="0"/>
+          <a:ext cx="0" cy="0"/>
+          <a:chOff x="0" y="0"/>
+          <a:chExt cx="0" cy="0"/>
+        </a:xfrm>
+      </p:grpSpPr>
+      <p:sp useBgFill="1">
+        <p:nvSpPr>
+          <p:cNvPr id="10" name="Rectangle 9">
+            <a:extLst>
+              <a:ext uri="{FF2B5EF4-FFF2-40B4-BE49-F238E27FC236}">
+                <a16:creationId xmlns:a16="http://schemas.microsoft.com/office/drawing/2014/main" id="{C96C8BAF-68F3-4B78-B238-35DF5D86560D}"/>
+              </a:ext>
+              <a:ext uri="{C183D7F6-B498-43B3-948B-1728B52AA6E4}">
+                <adec:decorative xmlns:adec="http://schemas.microsoft.com/office/drawing/2017/decorative" val="1"/>
+              </a:ext>
+            </a:extLst>
+          </p:cNvPr>
+          <p:cNvSpPr>
+            <a:spLocks noGrp="1" noRot="1" noChangeAspect="1" noMove="1" noResize="1" noEditPoints="1" noAdjustHandles="1" noChangeArrowheads="1" noChangeShapeType="1" noTextEdit="1"/>
+          </p:cNvSpPr>
+          <p:nvPr>
+            <p:extLst>
+              <p:ext uri="{386F3935-93C4-4BCD-93E2-E3B085C9AB24}">
+                <p16:designElem xmlns:p16="http://schemas.microsoft.com/office/powerpoint/2015/main" val="1"/>
+              </p:ext>
+            </p:extLst>
+          </p:nvPr>
+        </p:nvSpPr>
+        <p:spPr>
+          <a:xfrm>
+            <a:off x="0" y="0"/>
+            <a:ext cx="12192000" cy="6858000"/>
+          </a:xfrm>
+          <a:prstGeom prst="rect">
+            <a:avLst/>
+          </a:prstGeom>
+          <a:ln>
+            <a:noFill/>
+          </a:ln>
+        </p:spPr>
+        <p:style>
+          <a:lnRef idx="2">
+            <a:schemeClr val="accent1">
+              <a:shade val="50000"/>
+            </a:schemeClr>
+          </a:lnRef>
+          <a:fillRef idx="1">
+            <a:schemeClr val="accent1"/>
+          </a:fillRef>
+          <a:effectRef idx="0">
+            <a:schemeClr val="accent1"/>
+          </a:effectRef>
+          <a:fontRef idx="minor">
+            <a:schemeClr val="lt1"/>
+          </a:fontRef>
+        </p:style>
+        <p:txBody>
+          <a:bodyPr rtlCol="0" anchor="ctr"/>
+          <a:lstStyle/>
+          <a:p>
+            <a:pPr algn="ctr"/>
+            <a:endParaRPr lang="en-US"/>
+          </a:p>
+        </p:txBody>
+      </p:sp>
+      <p:grpSp>
+        <p:nvGrpSpPr>
+          <p:cNvPr id="12" name="Group 11">
+            <a:extLst>
+              <a:ext uri="{FF2B5EF4-FFF2-40B4-BE49-F238E27FC236}">
+                <a16:creationId xmlns:a16="http://schemas.microsoft.com/office/drawing/2014/main" id="{4F4CD6D0-5A87-4BA2-A13A-0E40511C3CFA}"/>
+              </a:ext>
+              <a:ext uri="{C183D7F6-B498-43B3-948B-1728B52AA6E4}">
+                <adec:decorative xmlns:adec="http://schemas.microsoft.com/office/drawing/2017/decorative" val="1"/>
+              </a:ext>
+            </a:extLst>
+          </p:cNvPr>
+          <p:cNvGrpSpPr>
+            <a:grpSpLocks noGrp="1" noUngrp="1" noRot="1" noChangeAspect="1" noMove="1" noResize="1"/>
+          </p:cNvGrpSpPr>
+          <p:nvPr>
+            <p:extLst>
+              <p:ext uri="{386F3935-93C4-4BCD-93E2-E3B085C9AB24}">
+                <p16:designElem xmlns:p16="http://schemas.microsoft.com/office/powerpoint/2015/main" val="1"/>
+              </p:ext>
+            </p:extLst>
+          </p:nvPr>
+        </p:nvGrpSpPr>
+        <p:grpSpPr>
+          <a:xfrm>
+            <a:off x="534774" y="699565"/>
+            <a:ext cx="3553132" cy="5156200"/>
+            <a:chOff x="7807230" y="2012810"/>
+            <a:chExt cx="3251252" cy="3459865"/>
+          </a:xfrm>
+        </p:grpSpPr>
+        <p:sp>
+          <p:nvSpPr>
+            <p:cNvPr id="13" name="Rectangle 12">
+              <a:extLst>
+                <a:ext uri="{FF2B5EF4-FFF2-40B4-BE49-F238E27FC236}">
+                  <a16:creationId xmlns:a16="http://schemas.microsoft.com/office/drawing/2014/main" id="{5877EAC0-2063-444D-8EE9-72FED2E03B26}"/>
+                </a:ext>
+                <a:ext uri="{C183D7F6-B498-43B3-948B-1728B52AA6E4}">
+                  <adec:decorative xmlns:adec="http://schemas.microsoft.com/office/drawing/2017/decorative" val="1"/>
+                </a:ext>
+              </a:extLst>
+            </p:cNvPr>
+            <p:cNvSpPr/>
+            <p:nvPr>
+              <p:extLst>
+                <p:ext uri="{386F3935-93C4-4BCD-93E2-E3B085C9AB24}">
+                  <p16:designElem xmlns:p16="http://schemas.microsoft.com/office/powerpoint/2015/main" val="1"/>
+                </p:ext>
+              </p:extLst>
+            </p:nvPr>
+          </p:nvSpPr>
+          <p:spPr>
+            <a:xfrm>
+              <a:off x="7807230" y="2012810"/>
+              <a:ext cx="3251252" cy="3459865"/>
+            </a:xfrm>
+            <a:prstGeom prst="rect">
+              <a:avLst/>
+            </a:prstGeom>
+            <a:gradFill>
+              <a:gsLst>
+                <a:gs pos="0">
+                  <a:srgbClr val="000001"/>
+                </a:gs>
+                <a:gs pos="100000">
+                  <a:srgbClr val="191919"/>
+                </a:gs>
+              </a:gsLst>
+            </a:gradFill>
+            <a:ln w="76200" cmpd="sng">
+              <a:noFill/>
+              <a:miter lim="800000"/>
+            </a:ln>
+            <a:effectLst>
+              <a:outerShdw blurRad="127000" dist="190500" dir="4740000" sx="98000" sy="98000" algn="tl" rotWithShape="0">
+                <a:srgbClr val="000000">
+                  <a:alpha val="34000"/>
+                </a:srgbClr>
+              </a:outerShdw>
+            </a:effectLst>
+            <a:scene3d>
+              <a:camera prst="orthographicFront"/>
+              <a:lightRig rig="threePt" dir="t"/>
+            </a:scene3d>
+            <a:sp3d>
+              <a:bevelT w="152400" h="50800" prst="softRound"/>
+            </a:sp3d>
+          </p:spPr>
+          <p:style>
+            <a:lnRef idx="1">
+              <a:schemeClr val="accent1"/>
+            </a:lnRef>
+            <a:fillRef idx="3">
+              <a:schemeClr val="accent1"/>
+            </a:fillRef>
+            <a:effectRef idx="2">
+              <a:schemeClr val="accent1"/>
+            </a:effectRef>
+            <a:fontRef idx="minor">
+              <a:schemeClr val="lt1"/>
+            </a:fontRef>
+          </p:style>
+          <p:txBody>
+            <a:bodyPr rtlCol="0" anchor="ctr"/>
+            <a:lstStyle/>
+            <a:p>
+              <a:pPr algn="ctr"/>
+              <a:endParaRPr lang="en-US"/>
+            </a:p>
+          </p:txBody>
+        </p:sp>
+        <p:sp>
+          <p:nvSpPr>
+            <p:cNvPr id="14" name="Rectangle 13">
+              <a:extLst>
+                <a:ext uri="{FF2B5EF4-FFF2-40B4-BE49-F238E27FC236}">
+                  <a16:creationId xmlns:a16="http://schemas.microsoft.com/office/drawing/2014/main" id="{2C155BF8-661A-4F4A-B4EC-923105C69221}"/>
+                </a:ext>
+                <a:ext uri="{C183D7F6-B498-43B3-948B-1728B52AA6E4}">
+                  <adec:decorative xmlns:adec="http://schemas.microsoft.com/office/drawing/2017/decorative" val="1"/>
+                </a:ext>
+              </a:extLst>
+            </p:cNvPr>
+            <p:cNvSpPr/>
+            <p:nvPr>
+              <p:extLst>
+                <p:ext uri="{386F3935-93C4-4BCD-93E2-E3B085C9AB24}">
+                  <p16:designElem xmlns:p16="http://schemas.microsoft.com/office/powerpoint/2015/main" val="1"/>
+                </p:ext>
+              </p:extLst>
+            </p:nvPr>
+          </p:nvSpPr>
+          <p:spPr>
+            <a:xfrm>
+              <a:off x="7807231" y="2026142"/>
+              <a:ext cx="3251250" cy="3440203"/>
+            </a:xfrm>
+            <a:prstGeom prst="rect">
+              <a:avLst/>
+            </a:prstGeom>
+            <a:gradFill>
+              <a:gsLst>
+                <a:gs pos="0">
+                  <a:srgbClr val="DADADA"/>
+                </a:gs>
+                <a:gs pos="100000">
+                  <a:srgbClr val="FFFFFE"/>
+                </a:gs>
+              </a:gsLst>
+              <a:lin ang="16200000" scaled="0"/>
+            </a:gradFill>
+            <a:ln w="76200" cmpd="sng">
+              <a:solidFill>
+                <a:srgbClr val="191919"/>
+              </a:solidFill>
+              <a:miter lim="800000"/>
+            </a:ln>
+            <a:effectLst>
+              <a:innerShdw blurRad="63500" dist="88900" dir="14100000">
+                <a:srgbClr val="000000">
+                  <a:alpha val="30000"/>
+                </a:srgbClr>
+              </a:innerShdw>
+            </a:effectLst>
+            <a:scene3d>
+              <a:camera prst="orthographicFront"/>
+              <a:lightRig rig="threePt" dir="t"/>
+            </a:scene3d>
+            <a:sp3d>
+              <a:bevelT w="38100" h="38100" prst="relaxedInset"/>
+            </a:sp3d>
+          </p:spPr>
+          <p:style>
+            <a:lnRef idx="1">
+              <a:schemeClr val="accent1"/>
+            </a:lnRef>
+            <a:fillRef idx="3">
+              <a:schemeClr val="accent1"/>
+            </a:fillRef>
+            <a:effectRef idx="2">
+              <a:schemeClr val="accent1"/>
+            </a:effectRef>
+            <a:fontRef idx="minor">
+              <a:schemeClr val="lt1"/>
+            </a:fontRef>
+          </p:style>
+          <p:txBody>
+            <a:bodyPr rtlCol="0" anchor="ctr"/>
+            <a:lstStyle/>
+            <a:p>
+              <a:pPr algn="ctr"/>
+              <a:endParaRPr lang="en-US"/>
+            </a:p>
+          </p:txBody>
+        </p:sp>
+      </p:grpSp>
+      <p:pic>
+        <p:nvPicPr>
+          <p:cNvPr id="4" name="Picture 3">
+            <a:extLst>
+              <a:ext uri="{FF2B5EF4-FFF2-40B4-BE49-F238E27FC236}">
+                <a16:creationId xmlns:a16="http://schemas.microsoft.com/office/drawing/2014/main" id="{6B8C51B0-5110-DFF4-4CDC-CB641E406C00}"/>
+              </a:ext>
+            </a:extLst>
+          </p:cNvPr>
+          <p:cNvPicPr>
+            <a:picLocks noChangeAspect="1"/>
+          </p:cNvPicPr>
+          <p:nvPr/>
+        </p:nvPicPr>
+        <p:blipFill>
+          <a:blip r:embed="rId2"/>
+          <a:stretch>
+            <a:fillRect/>
+          </a:stretch>
+        </p:blipFill>
+        <p:spPr>
+          <a:xfrm>
+            <a:off x="0" y="5866200"/>
+            <a:ext cx="989351" cy="994323"/>
+          </a:xfrm>
+          <a:prstGeom prst="rect">
+            <a:avLst/>
+          </a:prstGeom>
+        </p:spPr>
+      </p:pic>
+      <p:grpSp>
+        <p:nvGrpSpPr>
+          <p:cNvPr id="16" name="Group 15">
+            <a:extLst>
+              <a:ext uri="{FF2B5EF4-FFF2-40B4-BE49-F238E27FC236}">
+                <a16:creationId xmlns:a16="http://schemas.microsoft.com/office/drawing/2014/main" id="{E9537076-EF48-4F72-9164-FD8260D550AC}"/>
+              </a:ext>
+              <a:ext uri="{C183D7F6-B498-43B3-948B-1728B52AA6E4}">
+                <adec:decorative xmlns:adec="http://schemas.microsoft.com/office/drawing/2017/decorative" val="1"/>
+              </a:ext>
+            </a:extLst>
+          </p:cNvPr>
+          <p:cNvGrpSpPr>
+            <a:grpSpLocks noGrp="1" noUngrp="1" noRot="1" noChangeAspect="1" noMove="1" noResize="1"/>
+          </p:cNvGrpSpPr>
+          <p:nvPr>
+            <p:extLst>
+              <p:ext uri="{386F3935-93C4-4BCD-93E2-E3B085C9AB24}">
+                <p16:designElem xmlns:p16="http://schemas.microsoft.com/office/powerpoint/2015/main" val="1"/>
+              </p:ext>
+            </p:extLst>
+          </p:nvPr>
+        </p:nvGrpSpPr>
+        <p:grpSpPr>
+          <a:xfrm>
+            <a:off x="4319434" y="699565"/>
+            <a:ext cx="3553132" cy="5156200"/>
+            <a:chOff x="7807230" y="2012810"/>
+            <a:chExt cx="3251252" cy="3459865"/>
+          </a:xfrm>
+        </p:grpSpPr>
+        <p:sp>
+          <p:nvSpPr>
+            <p:cNvPr id="17" name="Rectangle 16">
+              <a:extLst>
+                <a:ext uri="{FF2B5EF4-FFF2-40B4-BE49-F238E27FC236}">
+                  <a16:creationId xmlns:a16="http://schemas.microsoft.com/office/drawing/2014/main" id="{689673CB-C48B-4D05-B6E4-B88CD5BAA00F}"/>
+                </a:ext>
+                <a:ext uri="{C183D7F6-B498-43B3-948B-1728B52AA6E4}">
+                  <adec:decorative xmlns:adec="http://schemas.microsoft.com/office/drawing/2017/decorative" val="1"/>
+                </a:ext>
+              </a:extLst>
+            </p:cNvPr>
+            <p:cNvSpPr/>
+            <p:nvPr>
+              <p:extLst>
+                <p:ext uri="{386F3935-93C4-4BCD-93E2-E3B085C9AB24}">
+                  <p16:designElem xmlns:p16="http://schemas.microsoft.com/office/powerpoint/2015/main" val="1"/>
+                </p:ext>
+              </p:extLst>
+            </p:nvPr>
+          </p:nvSpPr>
+          <p:spPr>
+            <a:xfrm>
+              <a:off x="7807230" y="2012810"/>
+              <a:ext cx="3251252" cy="3459865"/>
+            </a:xfrm>
+            <a:prstGeom prst="rect">
+              <a:avLst/>
+            </a:prstGeom>
+            <a:gradFill>
+              <a:gsLst>
+                <a:gs pos="0">
+                  <a:srgbClr val="000001"/>
+                </a:gs>
+                <a:gs pos="100000">
+                  <a:srgbClr val="191919"/>
+                </a:gs>
+              </a:gsLst>
+            </a:gradFill>
+            <a:ln w="76200" cmpd="sng">
+              <a:noFill/>
+              <a:miter lim="800000"/>
+            </a:ln>
+            <a:effectLst>
+              <a:outerShdw blurRad="127000" dist="190500" dir="4740000" sx="98000" sy="98000" algn="tl" rotWithShape="0">
+                <a:srgbClr val="000000">
+                  <a:alpha val="34000"/>
+                </a:srgbClr>
+              </a:outerShdw>
+            </a:effectLst>
+            <a:scene3d>
+              <a:camera prst="orthographicFront"/>
+              <a:lightRig rig="threePt" dir="t"/>
+            </a:scene3d>
+            <a:sp3d>
+              <a:bevelT w="152400" h="50800" prst="softRound"/>
+            </a:sp3d>
+          </p:spPr>
+          <p:style>
+            <a:lnRef idx="1">
+              <a:schemeClr val="accent1"/>
+            </a:lnRef>
+            <a:fillRef idx="3">
+              <a:schemeClr val="accent1"/>
+            </a:fillRef>
+            <a:effectRef idx="2">
+              <a:schemeClr val="accent1"/>
+            </a:effectRef>
+            <a:fontRef idx="minor">
+              <a:schemeClr val="lt1"/>
+            </a:fontRef>
+          </p:style>
+          <p:txBody>
+            <a:bodyPr rtlCol="0" anchor="ctr"/>
+            <a:lstStyle/>
+            <a:p>
+              <a:pPr algn="ctr"/>
+              <a:endParaRPr lang="en-US"/>
+            </a:p>
+          </p:txBody>
+        </p:sp>
+        <p:sp>
+          <p:nvSpPr>
+            <p:cNvPr id="18" name="Rectangle 17">
+              <a:extLst>
+                <a:ext uri="{FF2B5EF4-FFF2-40B4-BE49-F238E27FC236}">
+                  <a16:creationId xmlns:a16="http://schemas.microsoft.com/office/drawing/2014/main" id="{96C31A20-B341-476E-8C04-A26C87E1494F}"/>
+                </a:ext>
+                <a:ext uri="{C183D7F6-B498-43B3-948B-1728B52AA6E4}">
+                  <adec:decorative xmlns:adec="http://schemas.microsoft.com/office/drawing/2017/decorative" val="1"/>
+                </a:ext>
+              </a:extLst>
+            </p:cNvPr>
+            <p:cNvSpPr/>
+            <p:nvPr>
+              <p:extLst>
+                <p:ext uri="{386F3935-93C4-4BCD-93E2-E3B085C9AB24}">
+                  <p16:designElem xmlns:p16="http://schemas.microsoft.com/office/powerpoint/2015/main" val="1"/>
+                </p:ext>
+              </p:extLst>
+            </p:nvPr>
+          </p:nvSpPr>
+          <p:spPr>
+            <a:xfrm>
+              <a:off x="7807231" y="2026142"/>
+              <a:ext cx="3251250" cy="3440203"/>
+            </a:xfrm>
+            <a:prstGeom prst="rect">
+              <a:avLst/>
+            </a:prstGeom>
+            <a:gradFill>
+              <a:gsLst>
+                <a:gs pos="0">
+                  <a:srgbClr val="DADADA"/>
+                </a:gs>
+                <a:gs pos="100000">
+                  <a:srgbClr val="FFFFFE"/>
+                </a:gs>
+              </a:gsLst>
+              <a:lin ang="16200000" scaled="0"/>
+            </a:gradFill>
+            <a:ln w="76200" cmpd="sng">
+              <a:solidFill>
+                <a:srgbClr val="191919"/>
+              </a:solidFill>
+              <a:miter lim="800000"/>
+            </a:ln>
+            <a:effectLst>
+              <a:innerShdw blurRad="63500" dist="88900" dir="14100000">
+                <a:srgbClr val="000000">
+                  <a:alpha val="30000"/>
+                </a:srgbClr>
+              </a:innerShdw>
+            </a:effectLst>
+            <a:scene3d>
+              <a:camera prst="orthographicFront"/>
+              <a:lightRig rig="threePt" dir="t"/>
+            </a:scene3d>
+            <a:sp3d>
+              <a:bevelT w="38100" h="38100" prst="relaxedInset"/>
+            </a:sp3d>
+          </p:spPr>
+          <p:style>
+            <a:lnRef idx="1">
+              <a:schemeClr val="accent1"/>
+            </a:lnRef>
+            <a:fillRef idx="3">
+              <a:schemeClr val="accent1"/>
+            </a:fillRef>
+            <a:effectRef idx="2">
+              <a:schemeClr val="accent1"/>
+            </a:effectRef>
+            <a:fontRef idx="minor">
+              <a:schemeClr val="lt1"/>
+            </a:fontRef>
+          </p:style>
+          <p:txBody>
+            <a:bodyPr rtlCol="0" anchor="ctr"/>
+            <a:lstStyle/>
+            <a:p>
+              <a:pPr algn="ctr"/>
+              <a:endParaRPr lang="en-US"/>
+            </a:p>
+          </p:txBody>
+        </p:sp>
+      </p:grpSp>
+      <p:pic>
+        <p:nvPicPr>
+          <p:cNvPr id="5" name="Picture 4">
+            <a:extLst>
+              <a:ext uri="{FF2B5EF4-FFF2-40B4-BE49-F238E27FC236}">
+                <a16:creationId xmlns:a16="http://schemas.microsoft.com/office/drawing/2014/main" id="{0B206C32-D1A3-B5B7-ED02-B92851D5CD0C}"/>
+              </a:ext>
+            </a:extLst>
+          </p:cNvPr>
+          <p:cNvPicPr>
+            <a:picLocks noChangeAspect="1"/>
+          </p:cNvPicPr>
+          <p:nvPr/>
+        </p:nvPicPr>
+        <p:blipFill>
+          <a:blip r:embed="rId3"/>
+          <a:stretch>
+            <a:fillRect/>
+          </a:stretch>
+        </p:blipFill>
+        <p:spPr>
+          <a:xfrm>
+            <a:off x="4487333" y="1672893"/>
+            <a:ext cx="3209544" cy="3209544"/>
+          </a:xfrm>
+          <a:prstGeom prst="rect">
+            <a:avLst/>
+          </a:prstGeom>
+        </p:spPr>
+      </p:pic>
+      <p:grpSp>
+        <p:nvGrpSpPr>
+          <p:cNvPr id="20" name="Group 19">
+            <a:extLst>
+              <a:ext uri="{FF2B5EF4-FFF2-40B4-BE49-F238E27FC236}">
+                <a16:creationId xmlns:a16="http://schemas.microsoft.com/office/drawing/2014/main" id="{6EFC3492-86BD-4D75-B5B4-C2DBFE0BD106}"/>
+              </a:ext>
+              <a:ext uri="{C183D7F6-B498-43B3-948B-1728B52AA6E4}">
+                <adec:decorative xmlns:adec="http://schemas.microsoft.com/office/drawing/2017/decorative" val="1"/>
+              </a:ext>
+            </a:extLst>
+          </p:cNvPr>
+          <p:cNvGrpSpPr>
+            <a:grpSpLocks noGrp="1" noUngrp="1" noRot="1" noChangeAspect="1" noMove="1" noResize="1"/>
+          </p:cNvGrpSpPr>
+          <p:nvPr>
+            <p:extLst>
+              <p:ext uri="{386F3935-93C4-4BCD-93E2-E3B085C9AB24}">
+                <p16:designElem xmlns:p16="http://schemas.microsoft.com/office/powerpoint/2015/main" val="1"/>
+              </p:ext>
+            </p:extLst>
+          </p:nvPr>
+        </p:nvGrpSpPr>
+        <p:grpSpPr>
+          <a:xfrm>
+            <a:off x="8104093" y="699565"/>
+            <a:ext cx="3553132" cy="5156200"/>
+            <a:chOff x="7807230" y="2012810"/>
+            <a:chExt cx="3251252" cy="3459865"/>
+          </a:xfrm>
+        </p:grpSpPr>
+        <p:sp>
+          <p:nvSpPr>
+            <p:cNvPr id="21" name="Rectangle 20">
+              <a:extLst>
+                <a:ext uri="{FF2B5EF4-FFF2-40B4-BE49-F238E27FC236}">
+                  <a16:creationId xmlns:a16="http://schemas.microsoft.com/office/drawing/2014/main" id="{F72E5074-2516-4705-BFF1-F508394A0AC6}"/>
+                </a:ext>
+                <a:ext uri="{C183D7F6-B498-43B3-948B-1728B52AA6E4}">
+                  <adec:decorative xmlns:adec="http://schemas.microsoft.com/office/drawing/2017/decorative" val="1"/>
+                </a:ext>
+              </a:extLst>
+            </p:cNvPr>
+            <p:cNvSpPr/>
+            <p:nvPr>
+              <p:extLst>
+                <p:ext uri="{386F3935-93C4-4BCD-93E2-E3B085C9AB24}">
+                  <p16:designElem xmlns:p16="http://schemas.microsoft.com/office/powerpoint/2015/main" val="1"/>
+                </p:ext>
+              </p:extLst>
+            </p:nvPr>
+          </p:nvSpPr>
+          <p:spPr>
+            <a:xfrm>
+              <a:off x="7807230" y="2012810"/>
+              <a:ext cx="3251252" cy="3459865"/>
+            </a:xfrm>
+            <a:prstGeom prst="rect">
+              <a:avLst/>
+            </a:prstGeom>
+            <a:gradFill>
+              <a:gsLst>
+                <a:gs pos="0">
+                  <a:srgbClr val="000001"/>
+                </a:gs>
+                <a:gs pos="100000">
+                  <a:srgbClr val="191919"/>
+                </a:gs>
+              </a:gsLst>
+            </a:gradFill>
+            <a:ln w="76200" cmpd="sng">
+              <a:noFill/>
+              <a:miter lim="800000"/>
+            </a:ln>
+            <a:effectLst>
+              <a:outerShdw blurRad="127000" dist="190500" dir="4740000" sx="98000" sy="98000" algn="tl" rotWithShape="0">
+                <a:srgbClr val="000000">
+                  <a:alpha val="34000"/>
+                </a:srgbClr>
+              </a:outerShdw>
+            </a:effectLst>
+            <a:scene3d>
+              <a:camera prst="orthographicFront"/>
+              <a:lightRig rig="threePt" dir="t"/>
+            </a:scene3d>
+            <a:sp3d>
+              <a:bevelT w="152400" h="50800" prst="softRound"/>
+            </a:sp3d>
+          </p:spPr>
+          <p:style>
+            <a:lnRef idx="1">
+              <a:schemeClr val="accent1"/>
+            </a:lnRef>
+            <a:fillRef idx="3">
+              <a:schemeClr val="accent1"/>
+            </a:fillRef>
+            <a:effectRef idx="2">
+              <a:schemeClr val="accent1"/>
+            </a:effectRef>
+            <a:fontRef idx="minor">
+              <a:schemeClr val="lt1"/>
+            </a:fontRef>
+          </p:style>
+          <p:txBody>
+            <a:bodyPr rtlCol="0" anchor="ctr"/>
+            <a:lstStyle/>
+            <a:p>
+              <a:pPr algn="ctr"/>
+              <a:endParaRPr lang="en-US"/>
+            </a:p>
+          </p:txBody>
+        </p:sp>
+        <p:sp>
+          <p:nvSpPr>
+            <p:cNvPr id="22" name="Rectangle 21">
+              <a:extLst>
+                <a:ext uri="{FF2B5EF4-FFF2-40B4-BE49-F238E27FC236}">
+                  <a16:creationId xmlns:a16="http://schemas.microsoft.com/office/drawing/2014/main" id="{02259E4C-F24C-4180-AEC3-76255D535E2C}"/>
+                </a:ext>
+                <a:ext uri="{C183D7F6-B498-43B3-948B-1728B52AA6E4}">
+                  <adec:decorative xmlns:adec="http://schemas.microsoft.com/office/drawing/2017/decorative" val="1"/>
+                </a:ext>
+              </a:extLst>
+            </p:cNvPr>
+            <p:cNvSpPr/>
+            <p:nvPr>
+              <p:extLst>
+                <p:ext uri="{386F3935-93C4-4BCD-93E2-E3B085C9AB24}">
+                  <p16:designElem xmlns:p16="http://schemas.microsoft.com/office/powerpoint/2015/main" val="1"/>
+                </p:ext>
+              </p:extLst>
+            </p:nvPr>
+          </p:nvSpPr>
+          <p:spPr>
+            <a:xfrm>
+              <a:off x="7807231" y="2026142"/>
+              <a:ext cx="3251250" cy="3440203"/>
+            </a:xfrm>
+            <a:prstGeom prst="rect">
+              <a:avLst/>
+            </a:prstGeom>
+            <a:gradFill>
+              <a:gsLst>
+                <a:gs pos="0">
+                  <a:srgbClr val="DADADA"/>
+                </a:gs>
+                <a:gs pos="100000">
+                  <a:srgbClr val="FFFFFE"/>
+                </a:gs>
+              </a:gsLst>
+              <a:lin ang="16200000" scaled="0"/>
+            </a:gradFill>
+            <a:ln w="76200" cmpd="sng">
+              <a:solidFill>
+                <a:srgbClr val="191919"/>
+              </a:solidFill>
+              <a:miter lim="800000"/>
+            </a:ln>
+            <a:effectLst>
+              <a:innerShdw blurRad="63500" dist="88900" dir="14100000">
+                <a:srgbClr val="000000">
+                  <a:alpha val="30000"/>
+                </a:srgbClr>
+              </a:innerShdw>
+            </a:effectLst>
+            <a:scene3d>
+              <a:camera prst="orthographicFront"/>
+              <a:lightRig rig="threePt" dir="t"/>
+            </a:scene3d>
+            <a:sp3d>
+              <a:bevelT w="38100" h="38100" prst="relaxedInset"/>
+            </a:sp3d>
+          </p:spPr>
+          <p:style>
+            <a:lnRef idx="1">
+              <a:schemeClr val="accent1"/>
+            </a:lnRef>
+            <a:fillRef idx="3">
+              <a:schemeClr val="accent1"/>
+            </a:fillRef>
+            <a:effectRef idx="2">
+              <a:schemeClr val="accent1"/>
+            </a:effectRef>
+            <a:fontRef idx="minor">
+              <a:schemeClr val="lt1"/>
+            </a:fontRef>
+          </p:style>
+          <p:txBody>
+            <a:bodyPr rtlCol="0" anchor="ctr"/>
+            <a:lstStyle/>
+            <a:p>
+              <a:pPr algn="ctr"/>
+              <a:endParaRPr lang="en-US"/>
+            </a:p>
+          </p:txBody>
+        </p:sp>
+      </p:grpSp>
+      <p:pic>
+        <p:nvPicPr>
+          <p:cNvPr id="3" name="Picture 2">
+            <a:extLst>
+              <a:ext uri="{FF2B5EF4-FFF2-40B4-BE49-F238E27FC236}">
+                <a16:creationId xmlns:a16="http://schemas.microsoft.com/office/drawing/2014/main" id="{D33A268F-9E67-FCFC-ACF4-72847E3E54AC}"/>
+              </a:ext>
+            </a:extLst>
+          </p:cNvPr>
+          <p:cNvPicPr>
+            <a:picLocks noChangeAspect="1"/>
+          </p:cNvPicPr>
+          <p:nvPr/>
+        </p:nvPicPr>
+        <p:blipFill>
+          <a:blip r:embed="rId4"/>
+          <a:stretch>
+            <a:fillRect/>
+          </a:stretch>
+        </p:blipFill>
+        <p:spPr>
+          <a:xfrm>
+            <a:off x="8275887" y="1672893"/>
+            <a:ext cx="3209544" cy="3209544"/>
+          </a:xfrm>
+          <a:prstGeom prst="rect">
+            <a:avLst/>
+          </a:prstGeom>
+        </p:spPr>
+      </p:pic>
+      <p:sp>
+        <p:nvSpPr>
+          <p:cNvPr id="6" name="TextBox 5">
+            <a:extLst>
+              <a:ext uri="{FF2B5EF4-FFF2-40B4-BE49-F238E27FC236}">
+                <a16:creationId xmlns:a16="http://schemas.microsoft.com/office/drawing/2014/main" id="{02CC6048-5864-4EE4-FBF3-25844E41141A}"/>
+              </a:ext>
+            </a:extLst>
+          </p:cNvPr>
+          <p:cNvSpPr txBox="1"/>
+          <p:nvPr/>
+        </p:nvSpPr>
+        <p:spPr>
+          <a:xfrm>
+            <a:off x="4622680" y="4724982"/>
+            <a:ext cx="3116561" cy="923330"/>
+          </a:xfrm>
+          <a:prstGeom prst="rect">
+            <a:avLst/>
+          </a:prstGeom>
+          <a:noFill/>
+        </p:spPr>
+        <p:txBody>
+          <a:bodyPr rot="0" spcFirstLastPara="0" vertOverflow="overflow" horzOverflow="overflow" vert="horz" wrap="square" lIns="91440" tIns="45720" rIns="91440" bIns="45720" numCol="1" spcCol="0" rtlCol="0" fromWordArt="0" anchor="t" anchorCtr="0" forceAA="0" compatLnSpc="1">
+            <a:prstTxWarp prst="textNoShape">
+              <a:avLst/>
+            </a:prstTxWarp>
+            <a:spAutoFit/>
+          </a:bodyPr>
+          <a:lstStyle/>
+          <a:p>
+            <a:br>
+              <a:rPr lang="en-US" dirty="0"/>
+            </a:br>
+            <a:r>
+              <a:rPr lang="en-US" sz="3600" dirty="0">
+                <a:latin typeface="Arial"/>
+                <a:cs typeface="Arial"/>
+              </a:rPr>
+              <a:t>Mine Tracker</a:t>
+            </a:r>
+            <a:endParaRPr lang="en-US" dirty="0"/>
+          </a:p>
+        </p:txBody>
+      </p:sp>
+      <p:sp>
+        <p:nvSpPr>
+          <p:cNvPr id="7" name="TextBox 6">
+            <a:extLst>
+              <a:ext uri="{FF2B5EF4-FFF2-40B4-BE49-F238E27FC236}">
+                <a16:creationId xmlns:a16="http://schemas.microsoft.com/office/drawing/2014/main" id="{8B0A208C-A90B-CA19-2643-3D4272E516A1}"/>
+              </a:ext>
+            </a:extLst>
+          </p:cNvPr>
+          <p:cNvSpPr txBox="1"/>
+          <p:nvPr/>
+        </p:nvSpPr>
+        <p:spPr>
+          <a:xfrm>
+            <a:off x="8568459" y="4723442"/>
+            <a:ext cx="2624400" cy="923330"/>
+          </a:xfrm>
+          <a:prstGeom prst="rect">
+            <a:avLst/>
+          </a:prstGeom>
+          <a:noFill/>
+        </p:spPr>
+        <p:txBody>
+          <a:bodyPr rot="0" spcFirstLastPara="0" vertOverflow="overflow" horzOverflow="overflow" vert="horz" wrap="square" lIns="91440" tIns="45720" rIns="91440" bIns="45720" numCol="1" spcCol="0" rtlCol="0" fromWordArt="0" anchor="t" anchorCtr="0" forceAA="0" compatLnSpc="1">
+            <a:prstTxWarp prst="textNoShape">
+              <a:avLst/>
+            </a:prstTxWarp>
+            <a:spAutoFit/>
+          </a:bodyPr>
+          <a:lstStyle/>
+          <a:p>
+            <a:br>
+              <a:rPr lang="en-US" dirty="0"/>
+            </a:br>
+            <a:r>
+              <a:rPr lang="en-US" sz="3600" dirty="0">
+                <a:latin typeface="Arial"/>
+                <a:cs typeface="Arial"/>
+              </a:rPr>
+              <a:t>Attendance </a:t>
+            </a:r>
+            <a:endParaRPr lang="en-US" dirty="0"/>
+          </a:p>
+        </p:txBody>
+      </p:sp>
+      <p:pic>
+        <p:nvPicPr>
+          <p:cNvPr id="8" name="Picture 7">
+            <a:extLst>
+              <a:ext uri="{FF2B5EF4-FFF2-40B4-BE49-F238E27FC236}">
+                <a16:creationId xmlns:a16="http://schemas.microsoft.com/office/drawing/2014/main" id="{0B5B3068-EBE0-DFEE-80D8-FF7FD226840C}"/>
+              </a:ext>
+            </a:extLst>
+          </p:cNvPr>
+          <p:cNvPicPr>
+            <a:picLocks noChangeAspect="1"/>
+          </p:cNvPicPr>
+          <p:nvPr/>
+        </p:nvPicPr>
+        <p:blipFill>
+          <a:blip r:embed="rId5"/>
+          <a:stretch>
+            <a:fillRect/>
+          </a:stretch>
+        </p:blipFill>
+        <p:spPr>
+          <a:xfrm>
+            <a:off x="912228" y="1871795"/>
+            <a:ext cx="2798223" cy="2811740"/>
+          </a:xfrm>
+          <a:prstGeom prst="rect">
+            <a:avLst/>
+          </a:prstGeom>
+        </p:spPr>
+      </p:pic>
+      <p:sp>
+        <p:nvSpPr>
+          <p:cNvPr id="15" name="TextBox 14">
+            <a:extLst>
+              <a:ext uri="{FF2B5EF4-FFF2-40B4-BE49-F238E27FC236}">
+                <a16:creationId xmlns:a16="http://schemas.microsoft.com/office/drawing/2014/main" id="{F8DF0F77-43B1-0D19-A1EE-C91FA7777DE2}"/>
+              </a:ext>
+            </a:extLst>
+          </p:cNvPr>
+          <p:cNvSpPr txBox="1"/>
+          <p:nvPr/>
+        </p:nvSpPr>
+        <p:spPr>
+          <a:xfrm>
+            <a:off x="1370771" y="4683535"/>
+            <a:ext cx="3116561" cy="923330"/>
+          </a:xfrm>
+          <a:prstGeom prst="rect">
+            <a:avLst/>
+          </a:prstGeom>
+          <a:noFill/>
+        </p:spPr>
+        <p:txBody>
+          <a:bodyPr rot="0" spcFirstLastPara="0" vertOverflow="overflow" horzOverflow="overflow" vert="horz" wrap="square" lIns="91440" tIns="45720" rIns="91440" bIns="45720" numCol="1" spcCol="0" rtlCol="0" fromWordArt="0" anchor="t" anchorCtr="0" forceAA="0" compatLnSpc="1">
+            <a:prstTxWarp prst="textNoShape">
+              <a:avLst/>
+            </a:prstTxWarp>
+            <a:spAutoFit/>
+          </a:bodyPr>
+          <a:lstStyle/>
+          <a:p>
+            <a:br>
+              <a:rPr lang="en-US" dirty="0"/>
+            </a:br>
+            <a:r>
+              <a:rPr lang="en-US" sz="3600" dirty="0">
+                <a:latin typeface="Arial"/>
+                <a:cs typeface="Arial"/>
+              </a:rPr>
+              <a:t>Discord</a:t>
+            </a:r>
+            <a:endParaRPr lang="en-US" dirty="0"/>
+          </a:p>
+        </p:txBody>
+      </p:sp>
+    </p:spTree>
+    <p:extLst>
+      <p:ext uri="{BB962C8B-B14F-4D97-AF65-F5344CB8AC3E}">
+        <p14:creationId xmlns:p14="http://schemas.microsoft.com/office/powerpoint/2010/main" val="154582144"/>
       </p:ext>
     </p:extLst>
   </p:cSld>

</xml_diff>